<commit_message>
update Git.pptx - insert pictures
</commit_message>
<xml_diff>
--- a/Git.pptx
+++ b/Git.pptx
@@ -4053,8 +4053,14 @@
                 <a:ea typeface="+mn-ea"/>
                 <a:cs typeface="+mn-cs"/>
               </a:rPr>
-              <a:t>12. format-patch: Tạo ra các patch (bản vá) cho các </a:t>
-            </a:r>
+              <a:t>12. format-patch: Tạo ra các patch (bản vá) cho các commit</a:t>
+            </a:r>
+          </a:p>
+          <a:p>
+            <a:pPr marL="171450" indent="-171450">
+              <a:buFontTx/>
+              <a:buChar char="-"/>
+            </a:pPr>
             <a:r>
               <a:rPr lang="en-US" sz="1200" b="0" kern="1200" smtClean="0">
                 <a:solidFill>
@@ -4065,25 +4071,7 @@
                 <a:ea typeface="+mn-ea"/>
                 <a:cs typeface="+mn-cs"/>
               </a:rPr>
-              <a:t>commit</a:t>
-            </a:r>
-          </a:p>
-          <a:p>
-            <a:pPr marL="171450" indent="-171450">
-              <a:buFontTx/>
-              <a:buChar char="-"/>
-            </a:pPr>
-            <a:r>
-              <a:rPr lang="en-US" sz="1200" b="0" kern="1200" smtClean="0">
-                <a:solidFill>
-                  <a:schemeClr val="tx1"/>
-                </a:solidFill>
-                <a:effectLst/>
-                <a:latin typeface="+mn-lt"/>
-                <a:ea typeface="+mn-ea"/>
-                <a:cs typeface="+mn-cs"/>
-              </a:rPr>
-              <a:t>Tạo ra n bản vá cho n commit gần nhất.</a:t>
+              <a:t>Tạo ra bản vá từ một commit.</a:t>
             </a:r>
           </a:p>
           <a:p>
@@ -4114,8 +4102,103 @@
                 <a:ea typeface="+mn-ea"/>
                 <a:cs typeface="+mn-cs"/>
               </a:rPr>
+              <a:t>Tạo ra n bản vá cho n commit gần nhất.</a:t>
+            </a:r>
+          </a:p>
+          <a:p>
+            <a:pPr marL="171450" marR="0" indent="-171450" algn="l" defTabSz="914400" rtl="0" eaLnBrk="1" fontAlgn="auto" latinLnBrk="0" hangingPunct="1">
+              <a:lnSpc>
+                <a:spcPct val="100000"/>
+              </a:lnSpc>
+              <a:spcBef>
+                <a:spcPts val="0"/>
+              </a:spcBef>
+              <a:spcAft>
+                <a:spcPts val="0"/>
+              </a:spcAft>
+              <a:buClrTx/>
+              <a:buSzTx/>
+              <a:buFontTx/>
+              <a:buChar char="-"/>
+              <a:tabLst/>
+              <a:defRPr/>
+            </a:pPr>
+            <a:r>
+              <a:rPr lang="en-US" sz="1200" b="0" kern="1200" smtClean="0">
+                <a:solidFill>
+                  <a:schemeClr val="tx1"/>
+                </a:solidFill>
+                <a:effectLst/>
+                <a:latin typeface="+mn-lt"/>
+                <a:ea typeface="+mn-ea"/>
+                <a:cs typeface="+mn-cs"/>
+              </a:rPr>
               <a:t>Tạo ra 1 bản vá cho n commit gần nhất.</a:t>
             </a:r>
+          </a:p>
+          <a:p>
+            <a:pPr marL="171450" marR="0" indent="-171450" algn="l" defTabSz="914400" rtl="0" eaLnBrk="1" fontAlgn="auto" latinLnBrk="0" hangingPunct="1">
+              <a:lnSpc>
+                <a:spcPct val="100000"/>
+              </a:lnSpc>
+              <a:spcBef>
+                <a:spcPts val="0"/>
+              </a:spcBef>
+              <a:spcAft>
+                <a:spcPts val="0"/>
+              </a:spcAft>
+              <a:buClrTx/>
+              <a:buSzTx/>
+              <a:buFontTx/>
+              <a:buChar char="-"/>
+              <a:tabLst/>
+              <a:defRPr/>
+            </a:pPr>
+            <a:r>
+              <a:rPr lang="vi-VN" sz="1200" b="0" kern="1200" smtClean="0">
+                <a:solidFill>
+                  <a:schemeClr val="tx1"/>
+                </a:solidFill>
+                <a:effectLst/>
+                <a:latin typeface="+mn-lt"/>
+                <a:ea typeface="+mn-ea"/>
+                <a:cs typeface="+mn-cs"/>
+              </a:rPr>
+              <a:t>Tạo </a:t>
+            </a:r>
+            <a:r>
+              <a:rPr lang="en-US" sz="1200" b="0" kern="1200" smtClean="0">
+                <a:solidFill>
+                  <a:schemeClr val="tx1"/>
+                </a:solidFill>
+                <a:effectLst/>
+                <a:latin typeface="+mn-lt"/>
+                <a:ea typeface="+mn-ea"/>
+                <a:cs typeface="+mn-cs"/>
+              </a:rPr>
+              <a:t>bản vá </a:t>
+            </a:r>
+            <a:r>
+              <a:rPr lang="vi-VN" sz="1200" b="0" kern="1200" smtClean="0">
+                <a:solidFill>
+                  <a:schemeClr val="tx1"/>
+                </a:solidFill>
+                <a:effectLst/>
+                <a:latin typeface="+mn-lt"/>
+                <a:ea typeface="+mn-ea"/>
+                <a:cs typeface="+mn-cs"/>
+              </a:rPr>
+              <a:t>từ tất cả những commits chưa push</a:t>
+            </a:r>
+            <a:endParaRPr lang="en-US" sz="1200" b="0" kern="1200" smtClean="0">
+              <a:solidFill>
+                <a:schemeClr val="tx1"/>
+              </a:solidFill>
+              <a:effectLst/>
+              <a:latin typeface="+mn-lt"/>
+              <a:ea typeface="+mn-ea"/>
+              <a:cs typeface="+mn-cs"/>
+            </a:endParaRPr>
           </a:p>
           <a:p>
             <a:pPr marL="171450" indent="-171450">
@@ -5403,10 +5486,10 @@
                 <a:ea typeface="+mn-ea"/>
                 <a:cs typeface="+mn-cs"/>
               </a:rPr>
-              <a:t>khôi phục các </a:t>
-            </a:r>
-            <a:r>
-              <a:rPr lang="vi-VN" sz="1200" b="0" i="0" kern="1200" smtClean="0">
+              <a:t>khôi phục các tệp</a:t>
+            </a:r>
+            <a:r>
+              <a:rPr lang="en-US" sz="1200" b="0" i="0" kern="1200" smtClean="0">
                 <a:solidFill>
                   <a:schemeClr val="tx1"/>
                 </a:solidFill>
@@ -5415,10 +5498,10 @@
                 <a:ea typeface="+mn-ea"/>
                 <a:cs typeface="+mn-cs"/>
               </a:rPr>
-              <a:t>tệp</a:t>
-            </a:r>
-            <a:r>
-              <a:rPr lang="en-US" sz="1200" b="0" i="0" kern="1200" smtClean="0">
+              <a:t> </a:t>
+            </a:r>
+            <a:r>
+              <a:rPr lang="vi-VN" sz="1200" b="0" i="0" kern="1200" smtClean="0">
                 <a:solidFill>
                   <a:schemeClr val="tx1"/>
                 </a:solidFill>
@@ -5427,10 +5510,10 @@
                 <a:ea typeface="+mn-ea"/>
                 <a:cs typeface="+mn-cs"/>
               </a:rPr>
-              <a:t> </a:t>
-            </a:r>
-            <a:r>
-              <a:rPr lang="vi-VN" sz="1200" b="0" i="0" kern="1200" smtClean="0">
+              <a:t>trong cây làm việc</a:t>
+            </a:r>
+            <a:r>
+              <a:rPr lang="en-US" sz="1200" b="0" kern="1200" smtClean="0">
                 <a:solidFill>
                   <a:schemeClr val="tx1"/>
                 </a:solidFill>
@@ -5439,10 +5522,16 @@
                 <a:ea typeface="+mn-ea"/>
                 <a:cs typeface="+mn-cs"/>
               </a:rPr>
-              <a:t>trong </a:t>
-            </a:r>
-            <a:r>
-              <a:rPr lang="vi-VN" sz="1200" b="0" i="0" kern="1200" smtClean="0">
+              <a:t>:</a:t>
+            </a:r>
+          </a:p>
+          <a:p>
+            <a:pPr marL="171450" indent="-171450">
+              <a:buFontTx/>
+              <a:buChar char="-"/>
+            </a:pPr>
+            <a:r>
+              <a:rPr lang="en-US" sz="1200" b="0" kern="1200" smtClean="0">
                 <a:solidFill>
                   <a:schemeClr val="tx1"/>
                 </a:solidFill>
@@ -5451,8 +5540,14 @@
                 <a:ea typeface="+mn-ea"/>
                 <a:cs typeface="+mn-cs"/>
               </a:rPr>
-              <a:t>cây làm việc</a:t>
-            </a:r>
+              <a:t>.</a:t>
+            </a:r>
+          </a:p>
+          <a:p>
+            <a:pPr marL="171450" indent="-171450">
+              <a:buFontTx/>
+              <a:buChar char="-"/>
+            </a:pPr>
             <a:r>
               <a:rPr lang="en-US" sz="1200" b="0" kern="1200" smtClean="0">
                 <a:solidFill>
@@ -5463,7 +5558,7 @@
                 <a:ea typeface="+mn-ea"/>
                 <a:cs typeface="+mn-cs"/>
               </a:rPr>
-              <a:t>:</a:t>
+              <a:t>.</a:t>
             </a:r>
           </a:p>
           <a:p>
@@ -5472,7 +5567,7 @@
               <a:buChar char="-"/>
             </a:pPr>
             <a:r>
-              <a:rPr lang="en-US" sz="1200" b="0" kern="1200" smtClean="0">
+              <a:rPr lang="vi-VN" sz="1200" b="0" i="0" kern="1200" smtClean="0">
                 <a:solidFill>
                   <a:schemeClr val="tx1"/>
                 </a:solidFill>
@@ -5481,16 +5576,10 @@
                 <a:ea typeface="+mn-ea"/>
                 <a:cs typeface="+mn-cs"/>
               </a:rPr>
-              <a:t>.</a:t>
-            </a:r>
-          </a:p>
-          <a:p>
-            <a:pPr marL="171450" indent="-171450">
-              <a:buFontTx/>
-              <a:buChar char="-"/>
-            </a:pPr>
-            <a:r>
-              <a:rPr lang="en-US" sz="1200" b="0" kern="1200" smtClean="0">
+              <a:t>Trong trường hợp bạn làm sai điều gì đó, bạn có thể thay thế các thay đổi cục bộ bằng lệnh</a:t>
+            </a:r>
+            <a:r>
+              <a:rPr lang="en-US" sz="1200" b="0" i="0" kern="1200" smtClean="0">
                 <a:solidFill>
                   <a:schemeClr val="tx1"/>
                 </a:solidFill>
@@ -5499,16 +5588,10 @@
                 <a:ea typeface="+mn-ea"/>
                 <a:cs typeface="+mn-cs"/>
               </a:rPr>
-              <a:t>.</a:t>
-            </a:r>
-          </a:p>
-          <a:p>
-            <a:pPr marL="171450" indent="-171450">
-              <a:buFontTx/>
-              <a:buChar char="-"/>
-            </a:pPr>
-            <a:r>
-              <a:rPr lang="vi-VN" sz="1200" b="0" i="0" kern="1200" smtClean="0">
+              <a:t> …, lệnh này thay thế những thay đổi trong "tree" đang làm việc với nội dung mới nhất của HEAD</a:t>
+            </a:r>
+            <a:r>
+              <a:rPr lang="en-US" sz="1200" b="0" i="0" kern="1200" smtClean="0">
                 <a:solidFill>
                   <a:schemeClr val="tx1"/>
                 </a:solidFill>
@@ -5517,8 +5600,44 @@
                 <a:ea typeface="+mn-ea"/>
                 <a:cs typeface="+mn-cs"/>
               </a:rPr>
-              <a:t>Trong trường hợp bạn làm sai điều gì đó, bạn có thể thay thế các thay đổi cục bộ bằng lệnh</a:t>
-            </a:r>
+              <a:t>.</a:t>
+            </a:r>
+          </a:p>
+          <a:p>
+            <a:pPr marL="0" indent="0">
+              <a:buFontTx/>
+              <a:buNone/>
+            </a:pPr>
+            <a:endParaRPr lang="en-US" sz="1200" b="0" i="0" kern="1200" smtClean="0">
+              <a:solidFill>
+                <a:schemeClr val="tx1"/>
+              </a:solidFill>
+              <a:effectLst/>
+              <a:latin typeface="+mn-lt"/>
+              <a:ea typeface="+mn-ea"/>
+              <a:cs typeface="+mn-cs"/>
+            </a:endParaRPr>
+          </a:p>
+          <a:p>
+            <a:pPr marL="0" indent="0">
+              <a:buFontTx/>
+              <a:buNone/>
+            </a:pPr>
+            <a:endParaRPr lang="en-US" sz="1200" b="0" i="0" kern="1200" smtClean="0">
+              <a:solidFill>
+                <a:schemeClr val="tx1"/>
+              </a:solidFill>
+              <a:effectLst/>
+              <a:latin typeface="+mn-lt"/>
+              <a:ea typeface="+mn-ea"/>
+              <a:cs typeface="+mn-cs"/>
+            </a:endParaRPr>
+          </a:p>
+          <a:p>
+            <a:pPr marL="0" indent="0">
+              <a:buFontTx/>
+              <a:buNone/>
+            </a:pPr>
             <a:r>
               <a:rPr lang="en-US" sz="1200" b="0" i="0" kern="1200" smtClean="0">
                 <a:solidFill>
@@ -5529,7 +5648,19 @@
                 <a:ea typeface="+mn-ea"/>
                 <a:cs typeface="+mn-cs"/>
               </a:rPr>
-              <a:t> …, lệnh này thay thế những thay đổi trong "tree" đang làm việc với nội dung mới nhất của HEAD.</a:t>
+              <a:t>**start</a:t>
+            </a:r>
+            <a:r>
+              <a:rPr lang="en-US" sz="1200" b="0" i="0" kern="1200" baseline="0" smtClean="0">
+                <a:solidFill>
+                  <a:schemeClr val="tx1"/>
+                </a:solidFill>
+                <a:effectLst/>
+                <a:latin typeface="+mn-lt"/>
+                <a:ea typeface="+mn-ea"/>
+                <a:cs typeface="+mn-cs"/>
+              </a:rPr>
+              <a:t> point: Tên một nhánh trên local hoặc trên remote (nhánh mới tạo sẽ có cấu trúc và dữ liệu giống start point, nếu để mặc định thì sẽ là nhánh đang làm việc).</a:t>
             </a:r>
             <a:endParaRPr lang="en-US" sz="1200" b="0" kern="1200" smtClean="0">
               <a:solidFill>
@@ -10396,6 +10527,13 @@
   <p:clrMapOvr>
     <a:masterClrMapping/>
   </p:clrMapOvr>
+  <p:timing>
+    <p:tnLst>
+      <p:par>
+        <p:cTn id="1" dur="indefinite" restart="never" nodeType="tmRoot"/>
+      </p:par>
+    </p:tnLst>
+  </p:timing>
 </p:sld>
 </file>
 
@@ -10580,6 +10718,30 @@
           </a:p>
         </p:txBody>
       </p:sp>
+      <p:pic>
+        <p:nvPicPr>
+          <p:cNvPr id="4" name="Picture 3"/>
+          <p:cNvPicPr>
+            <a:picLocks noChangeAspect="1"/>
+          </p:cNvPicPr>
+          <p:nvPr/>
+        </p:nvPicPr>
+        <p:blipFill>
+          <a:blip r:embed="rId3"/>
+          <a:stretch>
+            <a:fillRect/>
+          </a:stretch>
+        </p:blipFill>
+        <p:spPr>
+          <a:xfrm>
+            <a:off x="2805913" y="4005330"/>
+            <a:ext cx="6641134" cy="1863764"/>
+          </a:xfrm>
+          <a:prstGeom prst="rect">
+            <a:avLst/>
+          </a:prstGeom>
+        </p:spPr>
+      </p:pic>
     </p:spTree>
     <p:extLst>
       <p:ext uri="{BB962C8B-B14F-4D97-AF65-F5344CB8AC3E}">
@@ -10590,6 +10752,13 @@
   <p:clrMapOvr>
     <a:masterClrMapping/>
   </p:clrMapOvr>
+  <p:timing>
+    <p:tnLst>
+      <p:par>
+        <p:cTn id="1" dur="indefinite" restart="never" nodeType="tmRoot"/>
+      </p:par>
+    </p:tnLst>
+  </p:timing>
 </p:sld>
 </file>
 
@@ -10674,10 +10843,56 @@
               <a:rPr lang="en-US" smtClean="0"/>
               <a:t>repository</a:t>
             </a:r>
-            <a:endParaRPr lang="en-US"/>
+          </a:p>
+          <a:p>
+            <a:pPr lvl="1">
+              <a:buFont typeface="Wingdings" panose="05000000000000000000" pitchFamily="2" charset="2"/>
+              <a:buChar char="Ø"/>
+            </a:pPr>
+            <a:r>
+              <a:rPr lang="en-US"/>
+              <a:t> </a:t>
+            </a:r>
+            <a:r>
+              <a:rPr lang="en-US" smtClean="0">
+                <a:solidFill>
+                  <a:srgbClr val="C00000"/>
+                </a:solidFill>
+              </a:rPr>
+              <a:t>$ git fetch</a:t>
+            </a:r>
+            <a:endParaRPr lang="en-US">
+              <a:solidFill>
+                <a:srgbClr val="C00000"/>
+              </a:solidFill>
+            </a:endParaRPr>
           </a:p>
         </p:txBody>
       </p:sp>
+      <p:pic>
+        <p:nvPicPr>
+          <p:cNvPr id="4" name="Picture 3"/>
+          <p:cNvPicPr>
+            <a:picLocks noChangeAspect="1"/>
+          </p:cNvPicPr>
+          <p:nvPr/>
+        </p:nvPicPr>
+        <p:blipFill>
+          <a:blip r:embed="rId3"/>
+          <a:stretch>
+            <a:fillRect/>
+          </a:stretch>
+        </p:blipFill>
+        <p:spPr>
+          <a:xfrm>
+            <a:off x="3212757" y="2896000"/>
+            <a:ext cx="5828785" cy="3410459"/>
+          </a:xfrm>
+          <a:prstGeom prst="rect">
+            <a:avLst/>
+          </a:prstGeom>
+        </p:spPr>
+      </p:pic>
     </p:spTree>
     <p:extLst>
       <p:ext uri="{BB962C8B-B14F-4D97-AF65-F5344CB8AC3E}">
@@ -10688,6 +10903,13 @@
   <p:clrMapOvr>
     <a:masterClrMapping/>
   </p:clrMapOvr>
+  <p:timing>
+    <p:tnLst>
+      <p:par>
+        <p:cTn id="1" dur="indefinite" restart="never" nodeType="tmRoot"/>
+      </p:par>
+    </p:tnLst>
+  </p:timing>
 </p:sld>
 </file>
 
@@ -10825,6 +11047,30 @@
           </a:p>
         </p:txBody>
       </p:sp>
+      <p:pic>
+        <p:nvPicPr>
+          <p:cNvPr id="4" name="Picture 3"/>
+          <p:cNvPicPr>
+            <a:picLocks noChangeAspect="1"/>
+          </p:cNvPicPr>
+          <p:nvPr/>
+        </p:nvPicPr>
+        <p:blipFill>
+          <a:blip r:embed="rId3"/>
+          <a:stretch>
+            <a:fillRect/>
+          </a:stretch>
+        </p:blipFill>
+        <p:spPr>
+          <a:xfrm>
+            <a:off x="2889227" y="3661590"/>
+            <a:ext cx="6474505" cy="2541502"/>
+          </a:xfrm>
+          <a:prstGeom prst="rect">
+            <a:avLst/>
+          </a:prstGeom>
+        </p:spPr>
+      </p:pic>
     </p:spTree>
     <p:extLst>
       <p:ext uri="{BB962C8B-B14F-4D97-AF65-F5344CB8AC3E}">
@@ -10835,6 +11081,13 @@
   <p:clrMapOvr>
     <a:masterClrMapping/>
   </p:clrMapOvr>
+  <p:timing>
+    <p:tnLst>
+      <p:par>
+        <p:cTn id="1" dur="indefinite" restart="never" nodeType="tmRoot"/>
+      </p:par>
+    </p:tnLst>
+  </p:timing>
 </p:sld>
 </file>
 
@@ -10975,11 +11228,6 @@
               </a:rPr>
               <a:t>$ git am email.txt</a:t>
             </a:r>
-            <a:endParaRPr lang="en-US" smtClean="0">
-              <a:solidFill>
-                <a:srgbClr val="C00000"/>
-              </a:solidFill>
-            </a:endParaRPr>
           </a:p>
           <a:p>
             <a:pPr>
@@ -11000,6 +11248,30 @@
           </a:p>
         </p:txBody>
       </p:sp>
+      <p:pic>
+        <p:nvPicPr>
+          <p:cNvPr id="4" name="Picture 3"/>
+          <p:cNvPicPr>
+            <a:picLocks noChangeAspect="1"/>
+          </p:cNvPicPr>
+          <p:nvPr/>
+        </p:nvPicPr>
+        <p:blipFill>
+          <a:blip r:embed="rId3"/>
+          <a:stretch>
+            <a:fillRect/>
+          </a:stretch>
+        </p:blipFill>
+        <p:spPr>
+          <a:xfrm>
+            <a:off x="1887143" y="4471987"/>
+            <a:ext cx="8478674" cy="1039127"/>
+          </a:xfrm>
+          <a:prstGeom prst="rect">
+            <a:avLst/>
+          </a:prstGeom>
+        </p:spPr>
+      </p:pic>
     </p:spTree>
     <p:extLst>
       <p:ext uri="{BB962C8B-B14F-4D97-AF65-F5344CB8AC3E}">
@@ -11010,6 +11282,13 @@
   <p:clrMapOvr>
     <a:masterClrMapping/>
   </p:clrMapOvr>
+  <p:timing>
+    <p:tnLst>
+      <p:par>
+        <p:cTn id="1" dur="indefinite" restart="never" nodeType="tmRoot"/>
+      </p:par>
+    </p:tnLst>
+  </p:timing>
 </p:sld>
 </file>
 
@@ -11111,49 +11390,8 @@
                   <a:srgbClr val="C00000"/>
                 </a:solidFill>
               </a:rPr>
-              <a:t>$ git </a:t>
-            </a:r>
-            <a:r>
-              <a:rPr lang="en-US">
-                <a:solidFill>
-                  <a:srgbClr val="C00000"/>
-                </a:solidFill>
-              </a:rPr>
-              <a:t>format-patch </a:t>
-            </a:r>
-            <a:r>
-              <a:rPr lang="en-US" smtClean="0">
-                <a:solidFill>
-                  <a:srgbClr val="C00000"/>
-                </a:solidFill>
-              </a:rPr>
-              <a:t>-n</a:t>
-            </a:r>
-            <a:r>
-              <a:rPr lang="en-US">
-                <a:solidFill>
-                  <a:srgbClr val="C00000"/>
-                </a:solidFill>
-              </a:rPr>
-              <a:t>/ git </a:t>
-            </a:r>
-            <a:r>
-              <a:rPr lang="en-US">
-                <a:solidFill>
-                  <a:srgbClr val="C00000"/>
-                </a:solidFill>
-              </a:rPr>
-              <a:t>format-patch </a:t>
-            </a:r>
-            <a:r>
-              <a:rPr lang="en-US" smtClean="0">
-                <a:solidFill>
-                  <a:srgbClr val="C00000"/>
-                </a:solidFill>
-              </a:rPr>
-              <a:t>HEAD~n</a:t>
-            </a:r>
-            <a:endParaRPr lang="en-US"/>
+              <a:t>$ git format-patch COMMIT_ID</a:t>
+            </a:r>
           </a:p>
           <a:p>
             <a:pPr lvl="1">
@@ -11166,6 +11404,29 @@
                   <a:srgbClr val="C00000"/>
                 </a:solidFill>
               </a:rPr>
+              <a:t> $ git format-patch -n/ git format-patch </a:t>
+            </a:r>
+            <a:r>
+              <a:rPr lang="en-US" smtClean="0">
+                <a:solidFill>
+                  <a:srgbClr val="C00000"/>
+                </a:solidFill>
+              </a:rPr>
+              <a:t>HEAD~n</a:t>
+            </a:r>
+            <a:endParaRPr lang="en-US"/>
+          </a:p>
+          <a:p>
+            <a:pPr lvl="1">
+              <a:buFont typeface="Wingdings" panose="05000000000000000000" pitchFamily="2" charset="2"/>
+              <a:buChar char="Ø"/>
+            </a:pPr>
+            <a:r>
+              <a:rPr lang="en-US">
+                <a:solidFill>
+                  <a:srgbClr val="C00000"/>
+                </a:solidFill>
+              </a:rPr>
               <a:t> </a:t>
             </a:r>
             <a:r>
@@ -11176,14 +11437,63 @@
               </a:rPr>
               <a:t>$ git format-patch -n HEAD --stdout &gt; 0001-last-n-commits.patch</a:t>
             </a:r>
-            <a:endParaRPr lang="en-US">
-              <a:solidFill>
-                <a:srgbClr val="C00000"/>
-              </a:solidFill>
-            </a:endParaRPr>
+          </a:p>
+          <a:p>
+            <a:pPr lvl="1">
+              <a:buFont typeface="Wingdings" panose="05000000000000000000" pitchFamily="2" charset="2"/>
+              <a:buChar char="Ø"/>
+            </a:pPr>
+            <a:r>
+              <a:rPr lang="en-US">
+                <a:solidFill>
+                  <a:srgbClr val="C00000"/>
+                </a:solidFill>
+              </a:rPr>
+              <a:t> </a:t>
+            </a:r>
+            <a:r>
+              <a:rPr lang="en-US" smtClean="0">
+                <a:solidFill>
+                  <a:srgbClr val="C00000"/>
+                </a:solidFill>
+              </a:rPr>
+              <a:t>$ git </a:t>
+            </a:r>
+            <a:r>
+              <a:rPr lang="en-US">
+                <a:solidFill>
+                  <a:srgbClr val="C00000"/>
+                </a:solidFill>
+              </a:rPr>
+              <a:t>format-patch origin/master</a:t>
+            </a:r>
           </a:p>
         </p:txBody>
       </p:sp>
+      <p:pic>
+        <p:nvPicPr>
+          <p:cNvPr id="4" name="Picture 3"/>
+          <p:cNvPicPr>
+            <a:picLocks noChangeAspect="1"/>
+          </p:cNvPicPr>
+          <p:nvPr/>
+        </p:nvPicPr>
+        <p:blipFill>
+          <a:blip r:embed="rId3"/>
+          <a:stretch>
+            <a:fillRect/>
+          </a:stretch>
+        </p:blipFill>
+        <p:spPr>
+          <a:xfrm>
+            <a:off x="2464219" y="4527077"/>
+            <a:ext cx="7329257" cy="946966"/>
+          </a:xfrm>
+          <a:prstGeom prst="rect">
+            <a:avLst/>
+          </a:prstGeom>
+        </p:spPr>
+      </p:pic>
     </p:spTree>
     <p:extLst>
       <p:ext uri="{BB962C8B-B14F-4D97-AF65-F5344CB8AC3E}">
@@ -11194,6 +11504,13 @@
   <p:clrMapOvr>
     <a:masterClrMapping/>
   </p:clrMapOvr>
+  <p:timing>
+    <p:tnLst>
+      <p:par>
+        <p:cTn id="1" dur="indefinite" restart="never" nodeType="tmRoot"/>
+      </p:par>
+    </p:tnLst>
+  </p:timing>
 </p:sld>
 </file>
 
@@ -11375,7 +11692,23 @@
                   <a:srgbClr val="C00000"/>
                 </a:solidFill>
               </a:rPr>
-              <a:t> -format: </a:t>
+              <a:t> </a:t>
+            </a:r>
+            <a:r>
+              <a:rPr lang="en-US">
+                <a:solidFill>
+                  <a:srgbClr val="C00000"/>
+                </a:solidFill>
+              </a:rPr>
+              <a:t>-format: $ git log --pretty=format:"%h - %an, %ar : </a:t>
+            </a:r>
+            <a:r>
+              <a:rPr lang="en-US">
+                <a:solidFill>
+                  <a:srgbClr val="C00000"/>
+                </a:solidFill>
+              </a:rPr>
+              <a:t>%</a:t>
             </a:r>
             <a:r>
               <a:rPr lang="en-US" smtClean="0">
@@ -11383,7 +11716,21 @@
                   <a:srgbClr val="C00000"/>
                 </a:solidFill>
               </a:rPr>
-              <a:t>$ </a:t>
+              <a:t>s“</a:t>
+            </a:r>
+          </a:p>
+          <a:p>
+            <a:pPr lvl="1">
+              <a:buFont typeface="Wingdings" panose="05000000000000000000" pitchFamily="2" charset="2"/>
+              <a:buChar char="Ø"/>
+            </a:pPr>
+            <a:r>
+              <a:rPr lang="en-US" smtClean="0">
+                <a:solidFill>
+                  <a:srgbClr val="C00000"/>
+                </a:solidFill>
+              </a:rPr>
+              <a:t> </a:t>
             </a:r>
             <a:r>
               <a:rPr lang="en-US">
@@ -11391,54 +11738,40 @@
                   <a:srgbClr val="C00000"/>
                 </a:solidFill>
               </a:rPr>
-              <a:t>git log --pretty=format</a:t>
-            </a:r>
-            <a:r>
-              <a:rPr lang="en-US" smtClean="0">
-                <a:solidFill>
-                  <a:srgbClr val="C00000"/>
-                </a:solidFill>
-              </a:rPr>
-              <a:t>:”%</a:t>
-            </a:r>
-            <a:r>
-              <a:rPr lang="en-US">
-                <a:solidFill>
-                  <a:srgbClr val="C00000"/>
-                </a:solidFill>
-              </a:rPr>
-              <a:t>h - %an, %ar : %</a:t>
-            </a:r>
-            <a:r>
-              <a:rPr lang="en-US" smtClean="0">
-                <a:solidFill>
-                  <a:srgbClr val="C00000"/>
-                </a:solidFill>
-              </a:rPr>
-              <a:t>s”</a:t>
-            </a:r>
-            <a:endParaRPr lang="en-US" smtClean="0">
+              <a:t>--graph</a:t>
+            </a:r>
+            <a:endParaRPr lang="en-US">
               <a:solidFill>
                 <a:srgbClr val="C00000"/>
               </a:solidFill>
             </a:endParaRPr>
           </a:p>
-          <a:p>
-            <a:pPr lvl="1">
-              <a:buFont typeface="Wingdings" panose="05000000000000000000" pitchFamily="2" charset="2"/>
-              <a:buChar char="Ø"/>
-            </a:pPr>
-            <a:r>
-              <a:rPr lang="en-US">
-                <a:solidFill>
-                  <a:srgbClr val="C00000"/>
-                </a:solidFill>
-              </a:rPr>
-              <a:t> --graph</a:t>
-            </a:r>
-          </a:p>
         </p:txBody>
       </p:sp>
+      <p:pic>
+        <p:nvPicPr>
+          <p:cNvPr id="4" name="Picture 3"/>
+          <p:cNvPicPr>
+            <a:picLocks noChangeAspect="1"/>
+          </p:cNvPicPr>
+          <p:nvPr/>
+        </p:nvPicPr>
+        <p:blipFill>
+          <a:blip r:embed="rId3"/>
+          <a:stretch>
+            <a:fillRect/>
+          </a:stretch>
+        </p:blipFill>
+        <p:spPr>
+          <a:xfrm>
+            <a:off x="2930254" y="4732524"/>
+            <a:ext cx="6400256" cy="1495281"/>
+          </a:xfrm>
+          <a:prstGeom prst="rect">
+            <a:avLst/>
+          </a:prstGeom>
+        </p:spPr>
+      </p:pic>
     </p:spTree>
     <p:extLst>
       <p:ext uri="{BB962C8B-B14F-4D97-AF65-F5344CB8AC3E}">
@@ -11449,6 +11782,13 @@
   <p:clrMapOvr>
     <a:masterClrMapping/>
   </p:clrMapOvr>
+  <p:timing>
+    <p:tnLst>
+      <p:par>
+        <p:cTn id="1" dur="indefinite" restart="never" nodeType="tmRoot"/>
+      </p:par>
+    </p:tnLst>
+  </p:timing>
 </p:sld>
 </file>
 
@@ -11540,16 +11880,28 @@
               <a:buChar char="Ø"/>
             </a:pPr>
             <a:r>
+              <a:rPr lang="en-US" smtClean="0">
+                <a:solidFill>
+                  <a:srgbClr val="C00000"/>
+                </a:solidFill>
+              </a:rPr>
+              <a:t> $ </a:t>
+            </a:r>
+            <a:r>
               <a:rPr lang="en-US">
                 <a:solidFill>
                   <a:srgbClr val="C00000"/>
                 </a:solidFill>
               </a:rPr>
-              <a:t>$ git stash list [&lt;options&gt;] </a:t>
-            </a:r>
-            <a:r>
-              <a:rPr lang="en-US"/>
-              <a:t>List the stash entries that you currently have.</a:t>
+              <a:t>git stash list [&lt;options&gt;] </a:t>
+            </a:r>
+            <a:r>
+              <a:rPr lang="en-US" i="1" smtClean="0"/>
+              <a:t>#List </a:t>
+            </a:r>
+            <a:r>
+              <a:rPr lang="en-US" i="1"/>
+              <a:t>the stash entries that you currently have.</a:t>
             </a:r>
           </a:p>
           <a:p>
@@ -11558,16 +11910,28 @@
               <a:buChar char="Ø"/>
             </a:pPr>
             <a:r>
+              <a:rPr lang="en-US" smtClean="0">
+                <a:solidFill>
+                  <a:srgbClr val="C00000"/>
+                </a:solidFill>
+              </a:rPr>
+              <a:t> $ </a:t>
+            </a:r>
+            <a:r>
               <a:rPr lang="en-US">
                 <a:solidFill>
                   <a:srgbClr val="C00000"/>
                 </a:solidFill>
               </a:rPr>
-              <a:t>$ git stash show [&lt;stash&gt;] </a:t>
-            </a:r>
-            <a:r>
-              <a:rPr lang="en-US"/>
-              <a:t>Show the changes recorded in the stash entry.</a:t>
+              <a:t>git stash show [&lt;stash&gt;] </a:t>
+            </a:r>
+            <a:r>
+              <a:rPr lang="en-US" i="1" smtClean="0"/>
+              <a:t>#Show </a:t>
+            </a:r>
+            <a:r>
+              <a:rPr lang="en-US" i="1"/>
+              <a:t>the changes recorded in the stash entry.</a:t>
             </a:r>
           </a:p>
           <a:p>
@@ -11576,16 +11940,28 @@
               <a:buChar char="Ø"/>
             </a:pPr>
             <a:r>
+              <a:rPr lang="en-US" smtClean="0">
+                <a:solidFill>
+                  <a:srgbClr val="C00000"/>
+                </a:solidFill>
+              </a:rPr>
+              <a:t> $ </a:t>
+            </a:r>
+            <a:r>
               <a:rPr lang="en-US">
                 <a:solidFill>
                   <a:srgbClr val="C00000"/>
                 </a:solidFill>
               </a:rPr>
-              <a:t>$ git stash show [&lt;stash&gt;] </a:t>
-            </a:r>
-            <a:r>
-              <a:rPr lang="en-US"/>
-              <a:t>Show the changes recorded in the stash entry.</a:t>
+              <a:t>git stash show [&lt;stash&gt;] </a:t>
+            </a:r>
+            <a:r>
+              <a:rPr lang="en-US" i="1" smtClean="0"/>
+              <a:t>#Show </a:t>
+            </a:r>
+            <a:r>
+              <a:rPr lang="en-US" i="1"/>
+              <a:t>the changes recorded in the stash entry.</a:t>
             </a:r>
           </a:p>
           <a:p>
@@ -11594,12 +11970,20 @@
               <a:buChar char="Ø"/>
             </a:pPr>
             <a:r>
+              <a:rPr lang="en-US" smtClean="0">
+                <a:solidFill>
+                  <a:srgbClr val="C00000"/>
+                </a:solidFill>
+              </a:rPr>
+              <a:t> $ </a:t>
+            </a:r>
+            <a:r>
               <a:rPr lang="en-US">
                 <a:solidFill>
                   <a:srgbClr val="C00000"/>
                 </a:solidFill>
               </a:rPr>
-              <a:t>$ git stash pop [--index] [-q|--quiet] [&lt;stash</a:t>
+              <a:t>git stash pop [--index] [-q|--quiet] [&lt;stash</a:t>
             </a:r>
             <a:r>
               <a:rPr lang="en-US" smtClean="0">
@@ -11610,8 +11994,12 @@
               <a:t>&gt;] </a:t>
             </a:r>
             <a:r>
-              <a:rPr lang="en-US"/>
-              <a:t>Remove a single stashed state from the stash list and apply it on top of the current working tree state</a:t>
+              <a:rPr lang="en-US" i="1" smtClean="0"/>
+              <a:t>#Remove </a:t>
+            </a:r>
+            <a:r>
+              <a:rPr lang="en-US" i="1"/>
+              <a:t>a single stashed state from the stash list and apply it on top of the current working tree state</a:t>
             </a:r>
             <a:r>
               <a:rPr lang="en-US" smtClean="0"/>
@@ -11625,12 +12013,20 @@
               <a:buChar char="Ø"/>
             </a:pPr>
             <a:r>
+              <a:rPr lang="en-US" smtClean="0">
+                <a:solidFill>
+                  <a:srgbClr val="C00000"/>
+                </a:solidFill>
+              </a:rPr>
+              <a:t> $ </a:t>
+            </a:r>
+            <a:r>
               <a:rPr lang="en-US">
                 <a:solidFill>
                   <a:srgbClr val="C00000"/>
                 </a:solidFill>
               </a:rPr>
-              <a:t>$ git stash </a:t>
+              <a:t>git stash </a:t>
             </a:r>
             <a:r>
               <a:rPr lang="en-US" smtClean="0">
@@ -11641,14 +12037,18 @@
               <a:t>clear </a:t>
             </a:r>
             <a:r>
-              <a:rPr lang="en-US"/>
-              <a:t>Remove all the stash </a:t>
-            </a:r>
-            <a:r>
-              <a:rPr lang="en-US" smtClean="0"/>
+              <a:rPr lang="en-US" i="1" smtClean="0"/>
+              <a:t>#Remove </a:t>
+            </a:r>
+            <a:r>
+              <a:rPr lang="en-US" i="1"/>
+              <a:t>all the stash </a:t>
+            </a:r>
+            <a:r>
+              <a:rPr lang="en-US" i="1" smtClean="0"/>
               <a:t>entries.</a:t>
             </a:r>
-            <a:endParaRPr lang="en-US"/>
+            <a:endParaRPr lang="en-US" i="1"/>
           </a:p>
           <a:p>
             <a:pPr lvl="1">
@@ -11659,6 +12059,30 @@
           </a:p>
         </p:txBody>
       </p:sp>
+      <p:pic>
+        <p:nvPicPr>
+          <p:cNvPr id="4" name="Picture 3"/>
+          <p:cNvPicPr>
+            <a:picLocks noChangeAspect="1"/>
+          </p:cNvPicPr>
+          <p:nvPr/>
+        </p:nvPicPr>
+        <p:blipFill>
+          <a:blip r:embed="rId3"/>
+          <a:stretch>
+            <a:fillRect/>
+          </a:stretch>
+        </p:blipFill>
+        <p:spPr>
+          <a:xfrm>
+            <a:off x="2995909" y="3085456"/>
+            <a:ext cx="6249288" cy="2586295"/>
+          </a:xfrm>
+          <a:prstGeom prst="rect">
+            <a:avLst/>
+          </a:prstGeom>
+        </p:spPr>
+      </p:pic>
     </p:spTree>
     <p:extLst>
       <p:ext uri="{BB962C8B-B14F-4D97-AF65-F5344CB8AC3E}">
@@ -11669,6 +12093,81 @@
   <p:clrMapOvr>
     <a:masterClrMapping/>
   </p:clrMapOvr>
+  <p:timing>
+    <p:tnLst>
+      <p:par>
+        <p:cTn id="1" dur="indefinite" restart="never" nodeType="tmRoot">
+          <p:childTnLst>
+            <p:seq concurrent="1" nextAc="seek">
+              <p:cTn id="2" dur="indefinite" nodeType="mainSeq">
+                <p:childTnLst>
+                  <p:par>
+                    <p:cTn id="3" fill="hold">
+                      <p:stCondLst>
+                        <p:cond delay="indefinite"/>
+                      </p:stCondLst>
+                      <p:childTnLst>
+                        <p:par>
+                          <p:cTn id="4" fill="hold">
+                            <p:stCondLst>
+                              <p:cond delay="0"/>
+                            </p:stCondLst>
+                            <p:childTnLst>
+                              <p:par>
+                                <p:cTn id="5" presetID="1" presetClass="entr" presetSubtype="0" fill="hold" nodeType="clickEffect">
+                                  <p:stCondLst>
+                                    <p:cond delay="0"/>
+                                  </p:stCondLst>
+                                  <p:childTnLst>
+                                    <p:set>
+                                      <p:cBhvr>
+                                        <p:cTn id="6" dur="1" fill="hold">
+                                          <p:stCondLst>
+                                            <p:cond delay="0"/>
+                                          </p:stCondLst>
+                                        </p:cTn>
+                                        <p:tgtEl>
+                                          <p:spTgt spid="4"/>
+                                        </p:tgtEl>
+                                        <p:attrNameLst>
+                                          <p:attrName>style.visibility</p:attrName>
+                                        </p:attrNameLst>
+                                      </p:cBhvr>
+                                      <p:to>
+                                        <p:strVal val="visible"/>
+                                      </p:to>
+                                    </p:set>
+                                  </p:childTnLst>
+                                </p:cTn>
+                              </p:par>
+                            </p:childTnLst>
+                          </p:cTn>
+                        </p:par>
+                      </p:childTnLst>
+                    </p:cTn>
+                  </p:par>
+                </p:childTnLst>
+              </p:cTn>
+              <p:prevCondLst>
+                <p:cond evt="onPrev" delay="0">
+                  <p:tgtEl>
+                    <p:sldTgt/>
+                  </p:tgtEl>
+                </p:cond>
+              </p:prevCondLst>
+              <p:nextCondLst>
+                <p:cond evt="onNext" delay="0">
+                  <p:tgtEl>
+                    <p:sldTgt/>
+                  </p:tgtEl>
+                </p:cond>
+              </p:nextCondLst>
+            </p:seq>
+          </p:childTnLst>
+        </p:cTn>
+      </p:par>
+    </p:tnLst>
+  </p:timing>
 </p:sld>
 </file>
 
@@ -11763,6 +12262,13 @@
   <p:clrMapOvr>
     <a:masterClrMapping/>
   </p:clrMapOvr>
+  <p:timing>
+    <p:tnLst>
+      <p:par>
+        <p:cTn id="1" dur="indefinite" restart="never" nodeType="tmRoot"/>
+      </p:par>
+    </p:tnLst>
+  </p:timing>
 </p:sld>
 </file>
 
@@ -11874,42 +12380,33 @@
             </a:r>
           </a:p>
           <a:p>
-            <a:pPr marL="201168" lvl="1" indent="0">
-              <a:buNone/>
-            </a:pPr>
-            <a:r>
-              <a:rPr lang="en-US" sz="1800" smtClean="0">
-                <a:solidFill>
-                  <a:srgbClr val="C00000"/>
-                </a:solidFill>
-              </a:rPr>
-              <a:t>$ </a:t>
-            </a:r>
-            <a:r>
-              <a:rPr lang="en-US" sz="1800">
-                <a:solidFill>
-                  <a:srgbClr val="C00000"/>
-                </a:solidFill>
-              </a:rPr>
-              <a:t>git </a:t>
-            </a:r>
-            <a:r>
-              <a:rPr lang="en-US" sz="1800" smtClean="0">
-                <a:solidFill>
-                  <a:srgbClr val="C00000"/>
-                </a:solidFill>
-              </a:rPr>
-              <a:t>init</a:t>
-            </a:r>
-          </a:p>
-          <a:p>
             <a:pPr lvl="1">
               <a:buFont typeface="Wingdings" panose="05000000000000000000" pitchFamily="2" charset="2"/>
               <a:buChar char="Ø"/>
             </a:pPr>
             <a:r>
-              <a:rPr lang="en-US" sz="1800" smtClean="0"/>
-              <a:t> This creates a new subdirectory named .git that contains all of your necessary repository files.</a:t>
+              <a:rPr lang="en-US" sz="1800" smtClean="0">
+                <a:solidFill>
+                  <a:srgbClr val="C00000"/>
+                </a:solidFill>
+              </a:rPr>
+              <a:t> $ </a:t>
+            </a:r>
+            <a:r>
+              <a:rPr lang="en-US" sz="1800">
+                <a:solidFill>
+                  <a:srgbClr val="C00000"/>
+                </a:solidFill>
+              </a:rPr>
+              <a:t>git </a:t>
+            </a:r>
+            <a:r>
+              <a:rPr lang="en-US" sz="1800" smtClean="0">
+                <a:solidFill>
+                  <a:srgbClr val="C00000"/>
+                </a:solidFill>
+              </a:rPr>
+              <a:t>init</a:t>
             </a:r>
           </a:p>
           <a:p>
@@ -11918,6 +12415,16 @@
               <a:buChar char="Ø"/>
             </a:pPr>
             <a:r>
+              <a:rPr lang="en-US" sz="1800" smtClean="0"/>
+              <a:t> This creates a new subdirectory named .git that contains all of your necessary repository files.</a:t>
+            </a:r>
+          </a:p>
+          <a:p>
+            <a:pPr lvl="1">
+              <a:buFont typeface="Wingdings" panose="05000000000000000000" pitchFamily="2" charset="2"/>
+              <a:buChar char="Ø"/>
+            </a:pPr>
+            <a:r>
               <a:rPr lang="en-US" smtClean="0"/>
               <a:t> Your </a:t>
             </a:r>
@@ -11974,6 +12481,30 @@
           </a:p>
         </p:txBody>
       </p:sp>
+      <p:pic>
+        <p:nvPicPr>
+          <p:cNvPr id="4" name="Picture 3"/>
+          <p:cNvPicPr>
+            <a:picLocks noChangeAspect="1"/>
+          </p:cNvPicPr>
+          <p:nvPr/>
+        </p:nvPicPr>
+        <p:blipFill>
+          <a:blip r:embed="rId3"/>
+          <a:stretch>
+            <a:fillRect/>
+          </a:stretch>
+        </p:blipFill>
+        <p:spPr>
+          <a:xfrm>
+            <a:off x="3583460" y="4365173"/>
+            <a:ext cx="6219438" cy="1701232"/>
+          </a:xfrm>
+          <a:prstGeom prst="rect">
+            <a:avLst/>
+          </a:prstGeom>
+        </p:spPr>
+      </p:pic>
     </p:spTree>
     <p:extLst>
       <p:ext uri="{BB962C8B-B14F-4D97-AF65-F5344CB8AC3E}">
@@ -11984,6 +12515,13 @@
   <p:clrMapOvr>
     <a:masterClrMapping/>
   </p:clrMapOvr>
+  <p:timing>
+    <p:tnLst>
+      <p:par>
+        <p:cTn id="1" dur="indefinite" restart="never" nodeType="tmRoot"/>
+      </p:par>
+    </p:tnLst>
+  </p:timing>
 </p:sld>
 </file>
 
@@ -12074,25 +12612,39 @@
             </a:r>
           </a:p>
           <a:p>
-            <a:pPr marL="201168" lvl="1" indent="0">
-              <a:buNone/>
+            <a:pPr lvl="1">
+              <a:buFont typeface="Wingdings" panose="05000000000000000000" pitchFamily="2" charset="2"/>
+              <a:buChar char="Ø"/>
             </a:pPr>
             <a:r>
+              <a:rPr lang="en-US" smtClean="0"/>
+              <a:t> If </a:t>
+            </a:r>
+            <a:r>
               <a:rPr lang="en-US"/>
-              <a:t>If you want to get a copy of an existing Git repository, the command you need is: </a:t>
-            </a:r>
-          </a:p>
-          <a:p>
-            <a:pPr marL="201168" lvl="1" indent="0">
-              <a:buNone/>
+              <a:t>you want to get a copy of an existing Git repository, the command you need is: </a:t>
+            </a:r>
+          </a:p>
+          <a:p>
+            <a:pPr lvl="1">
+              <a:buFont typeface="Wingdings" panose="05000000000000000000" pitchFamily="2" charset="2"/>
+              <a:buChar char="Ø"/>
             </a:pPr>
             <a:r>
+              <a:rPr lang="en-US" smtClean="0">
+                <a:solidFill>
+                  <a:srgbClr val="C00000"/>
+                </a:solidFill>
+              </a:rPr>
+              <a:t> $ </a:t>
+            </a:r>
+            <a:r>
               <a:rPr lang="en-US">
                 <a:solidFill>
                   <a:srgbClr val="C00000"/>
                 </a:solidFill>
               </a:rPr>
-              <a:t>$ git clone &lt;url</a:t>
+              <a:t>git clone &lt;url</a:t>
             </a:r>
             <a:r>
               <a:rPr lang="en-US" smtClean="0">
@@ -12104,17 +12656,46 @@
             </a:r>
           </a:p>
           <a:p>
-            <a:pPr marL="201168" lvl="1" indent="0">
-              <a:buNone/>
+            <a:pPr lvl="1">
+              <a:buFont typeface="Wingdings" panose="05000000000000000000" pitchFamily="2" charset="2"/>
+              <a:buChar char="Ø"/>
             </a:pPr>
             <a:r>
               <a:rPr lang="en-US" sz="1800" smtClean="0"/>
-              <a:t>This creates a directory, initializes a .git directory inside it, pulls down all the data for that repository and checks out a working copy of the latest version.</a:t>
+              <a:t> This </a:t>
+            </a:r>
+            <a:r>
+              <a:rPr lang="en-US" sz="1800" smtClean="0"/>
+              <a:t>creates a directory, initializes a .git directory inside it, pulls down all the data for that repository and checks out a working copy of the latest version.</a:t>
             </a:r>
             <a:endParaRPr lang="en-US" sz="1800"/>
           </a:p>
         </p:txBody>
       </p:sp>
+      <p:pic>
+        <p:nvPicPr>
+          <p:cNvPr id="4" name="Picture 3"/>
+          <p:cNvPicPr>
+            <a:picLocks noChangeAspect="1"/>
+          </p:cNvPicPr>
+          <p:nvPr/>
+        </p:nvPicPr>
+        <p:blipFill>
+          <a:blip r:embed="rId3"/>
+          <a:stretch>
+            <a:fillRect/>
+          </a:stretch>
+        </p:blipFill>
+        <p:spPr>
+          <a:xfrm>
+            <a:off x="2759238" y="4239397"/>
+            <a:ext cx="6734483" cy="1629697"/>
+          </a:xfrm>
+          <a:prstGeom prst="rect">
+            <a:avLst/>
+          </a:prstGeom>
+        </p:spPr>
+      </p:pic>
     </p:spTree>
     <p:extLst>
       <p:ext uri="{BB962C8B-B14F-4D97-AF65-F5344CB8AC3E}">
@@ -12125,6 +12706,13 @@
   <p:clrMapOvr>
     <a:masterClrMapping/>
   </p:clrMapOvr>
+  <p:timing>
+    <p:tnLst>
+      <p:par>
+        <p:cTn id="1" dur="indefinite" restart="never" nodeType="tmRoot"/>
+      </p:par>
+    </p:tnLst>
+  </p:timing>
 </p:sld>
 </file>
 
@@ -12371,6 +12959,30 @@
           </a:p>
         </p:txBody>
       </p:sp>
+      <p:pic>
+        <p:nvPicPr>
+          <p:cNvPr id="4" name="Picture 3"/>
+          <p:cNvPicPr>
+            <a:picLocks noChangeAspect="1"/>
+          </p:cNvPicPr>
+          <p:nvPr/>
+        </p:nvPicPr>
+        <p:blipFill>
+          <a:blip r:embed="rId3"/>
+          <a:stretch>
+            <a:fillRect/>
+          </a:stretch>
+        </p:blipFill>
+        <p:spPr>
+          <a:xfrm>
+            <a:off x="2397664" y="4568653"/>
+            <a:ext cx="7457631" cy="1300441"/>
+          </a:xfrm>
+          <a:prstGeom prst="rect">
+            <a:avLst/>
+          </a:prstGeom>
+        </p:spPr>
+      </p:pic>
     </p:spTree>
     <p:extLst>
       <p:ext uri="{BB962C8B-B14F-4D97-AF65-F5344CB8AC3E}">
@@ -12381,6 +12993,13 @@
   <p:clrMapOvr>
     <a:masterClrMapping/>
   </p:clrMapOvr>
+  <p:timing>
+    <p:tnLst>
+      <p:par>
+        <p:cTn id="1" dur="indefinite" restart="never" nodeType="tmRoot"/>
+      </p:par>
+    </p:tnLst>
+  </p:timing>
 </p:sld>
 </file>
 
@@ -12573,6 +13192,30 @@
           </a:graphicData>
         </a:graphic>
       </p:graphicFrame>
+      <p:pic>
+        <p:nvPicPr>
+          <p:cNvPr id="5" name="Picture 4"/>
+          <p:cNvPicPr>
+            <a:picLocks noChangeAspect="1"/>
+          </p:cNvPicPr>
+          <p:nvPr/>
+        </p:nvPicPr>
+        <p:blipFill>
+          <a:blip r:embed="rId8"/>
+          <a:stretch>
+            <a:fillRect/>
+          </a:stretch>
+        </p:blipFill>
+        <p:spPr>
+          <a:xfrm>
+            <a:off x="4911528" y="4139143"/>
+            <a:ext cx="6244152" cy="2140535"/>
+          </a:xfrm>
+          <a:prstGeom prst="rect">
+            <a:avLst/>
+          </a:prstGeom>
+        </p:spPr>
+      </p:pic>
     </p:spTree>
     <p:extLst>
       <p:ext uri="{BB962C8B-B14F-4D97-AF65-F5344CB8AC3E}">
@@ -12583,6 +13226,13 @@
   <p:clrMapOvr>
     <a:masterClrMapping/>
   </p:clrMapOvr>
+  <p:timing>
+    <p:tnLst>
+      <p:par>
+        <p:cTn id="1" dur="indefinite" restart="never" nodeType="tmRoot"/>
+      </p:par>
+    </p:tnLst>
+  </p:timing>
 </p:sld>
 </file>
 
@@ -12763,6 +13413,30 @@
           </a:p>
         </p:txBody>
       </p:sp>
+      <p:pic>
+        <p:nvPicPr>
+          <p:cNvPr id="4" name="Picture 3"/>
+          <p:cNvPicPr>
+            <a:picLocks noChangeAspect="1"/>
+          </p:cNvPicPr>
+          <p:nvPr/>
+        </p:nvPicPr>
+        <p:blipFill>
+          <a:blip r:embed="rId3"/>
+          <a:stretch>
+            <a:fillRect/>
+          </a:stretch>
+        </p:blipFill>
+        <p:spPr>
+          <a:xfrm>
+            <a:off x="4540826" y="2893026"/>
+            <a:ext cx="6614854" cy="3242806"/>
+          </a:xfrm>
+          <a:prstGeom prst="rect">
+            <a:avLst/>
+          </a:prstGeom>
+        </p:spPr>
+      </p:pic>
     </p:spTree>
     <p:extLst>
       <p:ext uri="{BB962C8B-B14F-4D97-AF65-F5344CB8AC3E}">
@@ -12773,6 +13447,13 @@
   <p:clrMapOvr>
     <a:masterClrMapping/>
   </p:clrMapOvr>
+  <p:timing>
+    <p:tnLst>
+      <p:par>
+        <p:cTn id="1" dur="indefinite" restart="never" nodeType="tmRoot"/>
+      </p:par>
+    </p:tnLst>
+  </p:timing>
 </p:sld>
 </file>
 
@@ -12867,67 +13548,109 @@
             </a:r>
           </a:p>
           <a:p>
-            <a:pPr marL="0" indent="0">
-              <a:buNone/>
-            </a:pPr>
-            <a:r>
-              <a:rPr lang="en-US" sz="1800">
-                <a:solidFill>
-                  <a:srgbClr val="C00000"/>
-                </a:solidFill>
-              </a:rPr>
-              <a:t>$ git checkout &lt;working_branch</a:t>
-            </a:r>
-            <a:r>
-              <a:rPr lang="en-US" sz="1800" smtClean="0">
-                <a:solidFill>
-                  <a:srgbClr val="C00000"/>
-                </a:solidFill>
-              </a:rPr>
-              <a:t>&gt;</a:t>
-            </a:r>
-          </a:p>
-          <a:p>
-            <a:pPr marL="0" indent="0">
-              <a:buNone/>
-            </a:pPr>
-            <a:r>
-              <a:rPr lang="en-US" sz="1800">
-                <a:solidFill>
-                  <a:srgbClr val="C00000"/>
-                </a:solidFill>
-              </a:rPr>
-              <a:t>$ git rebase &lt;rebase_branch</a:t>
-            </a:r>
-            <a:r>
-              <a:rPr lang="en-US" sz="1800" smtClean="0">
-                <a:solidFill>
-                  <a:srgbClr val="C00000"/>
-                </a:solidFill>
-              </a:rPr>
-              <a:t>&gt;</a:t>
-            </a:r>
-          </a:p>
-          <a:p>
-            <a:pPr>
+            <a:pPr lvl="1">
               <a:buFont typeface="Wingdings" panose="05000000000000000000" pitchFamily="2" charset="2"/>
               <a:buChar char="Ø"/>
             </a:pPr>
             <a:r>
-              <a:rPr lang="en-US" sz="1800"/>
+              <a:rPr lang="en-US" smtClean="0">
+                <a:solidFill>
+                  <a:srgbClr val="C00000"/>
+                </a:solidFill>
+              </a:rPr>
+              <a:t> $ </a:t>
+            </a:r>
+            <a:r>
+              <a:rPr lang="en-US">
+                <a:solidFill>
+                  <a:srgbClr val="C00000"/>
+                </a:solidFill>
+              </a:rPr>
+              <a:t>git checkout &lt;working_branch</a:t>
+            </a:r>
+            <a:r>
+              <a:rPr lang="en-US" smtClean="0">
+                <a:solidFill>
+                  <a:srgbClr val="C00000"/>
+                </a:solidFill>
+              </a:rPr>
+              <a:t>&gt;</a:t>
+            </a:r>
+          </a:p>
+          <a:p>
+            <a:pPr lvl="1">
+              <a:buFont typeface="Wingdings" panose="05000000000000000000" pitchFamily="2" charset="2"/>
+              <a:buChar char="Ø"/>
+            </a:pPr>
+            <a:r>
+              <a:rPr lang="en-US" smtClean="0">
+                <a:solidFill>
+                  <a:srgbClr val="C00000"/>
+                </a:solidFill>
+              </a:rPr>
+              <a:t> $ </a:t>
+            </a:r>
+            <a:r>
+              <a:rPr lang="en-US">
+                <a:solidFill>
+                  <a:srgbClr val="C00000"/>
+                </a:solidFill>
+              </a:rPr>
+              <a:t>git rebase &lt;rebase_branch</a:t>
+            </a:r>
+            <a:r>
+              <a:rPr lang="en-US" smtClean="0">
+                <a:solidFill>
+                  <a:srgbClr val="C00000"/>
+                </a:solidFill>
+              </a:rPr>
+              <a:t>&gt;</a:t>
+            </a:r>
+          </a:p>
+          <a:p>
+            <a:pPr lvl="1">
+              <a:buFont typeface="Wingdings" panose="05000000000000000000" pitchFamily="2" charset="2"/>
+              <a:buChar char="Ø"/>
+            </a:pPr>
+            <a:r>
+              <a:rPr lang="en-US"/>
               <a:t> </a:t>
             </a:r>
             <a:r>
-              <a:rPr lang="en-US" sz="1800" smtClean="0"/>
+              <a:rPr lang="en-US" smtClean="0"/>
               <a:t>Re-writes </a:t>
             </a:r>
             <a:r>
-              <a:rPr lang="en-US" sz="1800"/>
+              <a:rPr lang="en-US"/>
               <a:t>the project history by creating brand new commits for each commit in the original branch.</a:t>
             </a:r>
           </a:p>
         </p:txBody>
       </p:sp>
+      <p:pic>
+        <p:nvPicPr>
+          <p:cNvPr id="4" name="Picture 3"/>
+          <p:cNvPicPr>
+            <a:picLocks noChangeAspect="1"/>
+          </p:cNvPicPr>
+          <p:nvPr/>
+        </p:nvPicPr>
+        <p:blipFill>
+          <a:blip r:embed="rId3"/>
+          <a:stretch>
+            <a:fillRect/>
+          </a:stretch>
+        </p:blipFill>
+        <p:spPr>
+          <a:xfrm>
+            <a:off x="2973009" y="3991118"/>
+            <a:ext cx="6306942" cy="1986350"/>
+          </a:xfrm>
+          <a:prstGeom prst="rect">
+            <a:avLst/>
+          </a:prstGeom>
+        </p:spPr>
+      </p:pic>
     </p:spTree>
     <p:extLst>
       <p:ext uri="{BB962C8B-B14F-4D97-AF65-F5344CB8AC3E}">
@@ -12938,6 +13661,13 @@
   <p:clrMapOvr>
     <a:masterClrMapping/>
   </p:clrMapOvr>
+  <p:timing>
+    <p:tnLst>
+      <p:par>
+        <p:cTn id="1" dur="indefinite" restart="never" nodeType="tmRoot"/>
+      </p:par>
+    </p:tnLst>
+  </p:timing>
 </p:sld>
 </file>
 
@@ -12998,7 +13728,7 @@
         <p:spPr/>
         <p:txBody>
           <a:bodyPr>
-            <a:normAutofit lnSpcReduction="10000"/>
+            <a:normAutofit/>
           </a:bodyPr>
           <a:lstStyle/>
           <a:p>
@@ -13022,109 +13752,126 @@
             </a:r>
           </a:p>
           <a:p>
-            <a:pPr marL="0" indent="0">
-              <a:buNone/>
-            </a:pPr>
-            <a:r>
-              <a:rPr lang="en-US" sz="1800">
-                <a:solidFill>
-                  <a:srgbClr val="C00000"/>
-                </a:solidFill>
-              </a:rPr>
-              <a:t>$ git checkout &lt;working_branch</a:t>
-            </a:r>
-            <a:r>
-              <a:rPr lang="en-US" sz="1800" smtClean="0">
-                <a:solidFill>
-                  <a:srgbClr val="C00000"/>
-                </a:solidFill>
-              </a:rPr>
-              <a:t>&gt;</a:t>
-            </a:r>
-          </a:p>
-          <a:p>
-            <a:pPr marL="0" indent="0">
-              <a:buNone/>
-            </a:pPr>
-            <a:r>
-              <a:rPr lang="en-US" sz="1800" smtClean="0">
-                <a:solidFill>
-                  <a:srgbClr val="C00000"/>
-                </a:solidFill>
-              </a:rPr>
-              <a:t>$ </a:t>
-            </a:r>
-            <a:r>
-              <a:rPr lang="en-US" sz="1800">
-                <a:solidFill>
-                  <a:srgbClr val="C00000"/>
-                </a:solidFill>
-              </a:rPr>
-              <a:t>git merge &lt;merge_branch</a:t>
-            </a:r>
-            <a:r>
-              <a:rPr lang="en-US" sz="1800" smtClean="0">
-                <a:solidFill>
-                  <a:srgbClr val="C00000"/>
-                </a:solidFill>
-              </a:rPr>
-              <a:t>&gt;	</a:t>
-            </a:r>
-          </a:p>
-          <a:p>
-            <a:pPr>
+            <a:pPr lvl="1">
               <a:buFont typeface="Wingdings" panose="05000000000000000000" pitchFamily="2" charset="2"/>
               <a:buChar char="Ø"/>
             </a:pPr>
             <a:r>
-              <a:rPr lang="en-US" sz="1800" smtClean="0"/>
-              <a:t> This </a:t>
-            </a:r>
-            <a:r>
-              <a:rPr lang="en-US" sz="1800"/>
-              <a:t>create a new "merge commit" in the &lt;working_branch&gt; that ties together the histories of both branches.	</a:t>
-            </a:r>
-            <a:endParaRPr lang="en-US" sz="1800" smtClean="0"/>
-          </a:p>
-          <a:p>
-            <a:pPr>
+              <a:rPr lang="en-US" smtClean="0">
+                <a:solidFill>
+                  <a:srgbClr val="C00000"/>
+                </a:solidFill>
+              </a:rPr>
+              <a:t> $ </a:t>
+            </a:r>
+            <a:r>
+              <a:rPr lang="en-US">
+                <a:solidFill>
+                  <a:srgbClr val="C00000"/>
+                </a:solidFill>
+              </a:rPr>
+              <a:t>git checkout &lt;working_branch</a:t>
+            </a:r>
+            <a:r>
+              <a:rPr lang="en-US" smtClean="0">
+                <a:solidFill>
+                  <a:srgbClr val="C00000"/>
+                </a:solidFill>
+              </a:rPr>
+              <a:t>&gt;</a:t>
+            </a:r>
+          </a:p>
+          <a:p>
+            <a:pPr marL="201168" lvl="1" indent="0">
+              <a:buNone/>
+            </a:pPr>
+            <a:r>
+              <a:rPr lang="en-US" smtClean="0">
+                <a:solidFill>
+                  <a:srgbClr val="C00000"/>
+                </a:solidFill>
+              </a:rPr>
+              <a:t>     $ </a:t>
+            </a:r>
+            <a:r>
+              <a:rPr lang="en-US">
+                <a:solidFill>
+                  <a:srgbClr val="C00000"/>
+                </a:solidFill>
+              </a:rPr>
+              <a:t>git merge &lt;merge_branch</a:t>
+            </a:r>
+            <a:r>
+              <a:rPr lang="en-US" smtClean="0">
+                <a:solidFill>
+                  <a:srgbClr val="C00000"/>
+                </a:solidFill>
+              </a:rPr>
+              <a:t>&gt;</a:t>
+            </a:r>
+            <a:r>
+              <a:rPr lang="en-US" sz="1600" smtClean="0">
+                <a:solidFill>
+                  <a:srgbClr val="C00000"/>
+                </a:solidFill>
+              </a:rPr>
+              <a:t>	</a:t>
+            </a:r>
+          </a:p>
+          <a:p>
+            <a:pPr lvl="1">
               <a:buFont typeface="Wingdings" panose="05000000000000000000" pitchFamily="2" charset="2"/>
               <a:buChar char="Ø"/>
             </a:pPr>
             <a:r>
-              <a:rPr lang="en-US" sz="1800" smtClean="0"/>
-              <a:t> If </a:t>
-            </a:r>
-            <a:r>
-              <a:rPr lang="en-US" sz="1800"/>
-              <a:t>&lt;merge_branch&gt; is very active, this can pollute &lt;working_branch&gt;'s history quite a </a:t>
-            </a:r>
-            <a:r>
-              <a:rPr lang="en-US" sz="1800" smtClean="0"/>
-              <a:t>bit.</a:t>
-            </a:r>
-          </a:p>
-          <a:p>
-            <a:pPr>
+              <a:rPr lang="en-US" smtClean="0"/>
+              <a:t> This </a:t>
+            </a:r>
+            <a:r>
+              <a:rPr lang="en-US"/>
+              <a:t>create a new "merge commit" in the &lt;working_branch&gt; that ties together the histories of both branches.	</a:t>
+            </a:r>
+            <a:endParaRPr lang="en-US" smtClean="0"/>
+          </a:p>
+          <a:p>
+            <a:pPr lvl="1">
               <a:buFont typeface="Wingdings" panose="05000000000000000000" pitchFamily="2" charset="2"/>
               <a:buChar char="Ø"/>
             </a:pPr>
             <a:r>
-              <a:rPr lang="en-US" sz="1800"/>
+              <a:rPr lang="en-US" smtClean="0"/>
+              <a:t> If </a:t>
+            </a:r>
+            <a:r>
+              <a:rPr lang="en-US"/>
+              <a:t>&lt;merge_branch&gt; is very active, this can pollute &lt;working_branch&gt;'s history quite a </a:t>
+            </a:r>
+            <a:r>
+              <a:rPr lang="en-US" smtClean="0"/>
+              <a:t>bit.</a:t>
+            </a:r>
+          </a:p>
+          <a:p>
+            <a:pPr lvl="1">
+              <a:buFont typeface="Wingdings" panose="05000000000000000000" pitchFamily="2" charset="2"/>
+              <a:buChar char="Ø"/>
+            </a:pPr>
+            <a:r>
+              <a:rPr lang="en-US"/>
               <a:t> </a:t>
             </a:r>
             <a:r>
-              <a:rPr lang="en-US" sz="1800" smtClean="0"/>
+              <a:rPr lang="en-US" smtClean="0"/>
               <a:t>Conflict</a:t>
             </a:r>
           </a:p>
           <a:p>
-            <a:pPr lvl="1">
+            <a:pPr lvl="2">
               <a:buFont typeface="Wingdings" panose="05000000000000000000" pitchFamily="2" charset="2"/>
               <a:buChar char="ü"/>
             </a:pPr>
             <a:r>
-              <a:rPr lang="en-US" smtClean="0">
+              <a:rPr lang="en-US" sz="1800" smtClean="0">
                 <a:solidFill>
                   <a:srgbClr val="C00000"/>
                 </a:solidFill>
@@ -13132,7 +13879,7 @@
               <a:t> </a:t>
             </a:r>
             <a:r>
-              <a:rPr lang="en-US">
+              <a:rPr lang="en-US" sz="1800">
                 <a:solidFill>
                   <a:srgbClr val="C00000"/>
                 </a:solidFill>
@@ -13141,12 +13888,12 @@
             </a:r>
           </a:p>
           <a:p>
-            <a:pPr lvl="1">
+            <a:pPr lvl="2">
               <a:buFont typeface="Wingdings" panose="05000000000000000000" pitchFamily="2" charset="2"/>
               <a:buChar char="ü"/>
             </a:pPr>
             <a:r>
-              <a:rPr lang="en-US" smtClean="0">
+              <a:rPr lang="en-US" sz="1800" smtClean="0">
                 <a:solidFill>
                   <a:srgbClr val="C00000"/>
                 </a:solidFill>
@@ -13154,7 +13901,7 @@
               <a:t> $ </a:t>
             </a:r>
             <a:r>
-              <a:rPr lang="en-US">
+              <a:rPr lang="en-US" sz="1800">
                 <a:solidFill>
                   <a:srgbClr val="C00000"/>
                 </a:solidFill>
@@ -13163,28 +13910,36 @@
             </a:r>
           </a:p>
           <a:p>
-            <a:pPr lvl="1">
+            <a:pPr lvl="2">
               <a:buFont typeface="Wingdings" panose="05000000000000000000" pitchFamily="2" charset="2"/>
               <a:buChar char="ü"/>
             </a:pPr>
             <a:r>
-              <a:rPr lang="en-US" smtClean="0">
+              <a:rPr lang="en-US" sz="1800" smtClean="0">
                 <a:solidFill>
                   <a:srgbClr val="C00000"/>
                 </a:solidFill>
               </a:rPr>
-              <a:t>$ git </a:t>
-            </a:r>
-            <a:r>
-              <a:rPr lang="en-US">
+              <a:t> $ </a:t>
+            </a:r>
+            <a:r>
+              <a:rPr lang="en-US" sz="1800" smtClean="0">
                 <a:solidFill>
                   <a:srgbClr val="C00000"/>
                 </a:solidFill>
               </a:rPr>
+              <a:t>git </a:t>
+            </a:r>
+            <a:r>
+              <a:rPr lang="en-US" sz="1800">
+                <a:solidFill>
+                  <a:srgbClr val="C00000"/>
+                </a:solidFill>
+              </a:rPr>
               <a:t>diff </a:t>
             </a:r>
             <a:r>
-              <a:rPr lang="en-US" smtClean="0">
+              <a:rPr lang="en-US" sz="1800" smtClean="0">
                 <a:solidFill>
                   <a:srgbClr val="C00000"/>
                 </a:solidFill>
@@ -13192,7 +13947,7 @@
               <a:t>&lt;</a:t>
             </a:r>
             <a:r>
-              <a:rPr lang="en-US">
+              <a:rPr lang="en-US" sz="1800">
                 <a:solidFill>
                   <a:srgbClr val="C00000"/>
                 </a:solidFill>
@@ -13200,7 +13955,7 @@
               <a:t>merge</a:t>
             </a:r>
             <a:r>
-              <a:rPr lang="en-US" smtClean="0">
+              <a:rPr lang="en-US" sz="1800" smtClean="0">
                 <a:solidFill>
                   <a:srgbClr val="C00000"/>
                 </a:solidFill>
@@ -13208,7 +13963,7 @@
               <a:t>_branch</a:t>
             </a:r>
             <a:r>
-              <a:rPr lang="en-US">
+              <a:rPr lang="en-US" sz="1800">
                 <a:solidFill>
                   <a:srgbClr val="C00000"/>
                 </a:solidFill>
@@ -13216,7 +13971,7 @@
               <a:t>&gt; </a:t>
             </a:r>
             <a:r>
-              <a:rPr lang="en-US" smtClean="0">
+              <a:rPr lang="en-US" sz="1800" smtClean="0">
                 <a:solidFill>
                   <a:srgbClr val="C00000"/>
                 </a:solidFill>
@@ -13224,7 +13979,7 @@
               <a:t>&lt;</a:t>
             </a:r>
             <a:r>
-              <a:rPr lang="en-US">
+              <a:rPr lang="en-US" sz="1800">
                 <a:solidFill>
                   <a:srgbClr val="C00000"/>
                 </a:solidFill>
@@ -13232,7 +13987,7 @@
               <a:t>working</a:t>
             </a:r>
             <a:r>
-              <a:rPr lang="en-US" smtClean="0">
+              <a:rPr lang="en-US" sz="1800" smtClean="0">
                 <a:solidFill>
                   <a:srgbClr val="C00000"/>
                 </a:solidFill>
@@ -13240,7 +13995,7 @@
               <a:t>_branch</a:t>
             </a:r>
             <a:r>
-              <a:rPr lang="en-US">
+              <a:rPr lang="en-US" sz="1800">
                 <a:solidFill>
                   <a:srgbClr val="C00000"/>
                 </a:solidFill>
@@ -13258,8 +14013,8 @@
         </p:nvSpPr>
         <p:spPr>
           <a:xfrm>
-            <a:off x="4406900" y="2895600"/>
-            <a:ext cx="406400" cy="889000"/>
+            <a:off x="4610100" y="2876325"/>
+            <a:ext cx="406400" cy="646331"/>
           </a:xfrm>
           <a:prstGeom prst="rightBrace">
             <a:avLst/>
@@ -13301,7 +14056,7 @@
         </p:nvSpPr>
         <p:spPr>
           <a:xfrm>
-            <a:off x="4813300" y="3138269"/>
+            <a:off x="5016500" y="2984699"/>
             <a:ext cx="4838700" cy="646331"/>
           </a:xfrm>
           <a:prstGeom prst="rect">
@@ -13339,6 +14094,13 @@
   <p:clrMapOvr>
     <a:masterClrMapping/>
   </p:clrMapOvr>
+  <p:timing>
+    <p:tnLst>
+      <p:par>
+        <p:cTn id="1" dur="indefinite" restart="never" nodeType="tmRoot"/>
+      </p:par>
+    </p:tnLst>
+  </p:timing>
 </p:sld>
 </file>
 

</xml_diff>

<commit_message>
update Git.pptx, create autotools.docx
</commit_message>
<xml_diff>
--- a/Git.pptx
+++ b/Git.pptx
@@ -2809,7 +2809,7 @@
           <a:p>
             <a:fld id="{BBF1C853-AD08-4A27-A327-210E1D1F3194}" type="datetimeFigureOut">
               <a:rPr lang="en-US" smtClean="0"/>
-              <a:t>12/20/2017</a:t>
+              <a:t>12/21/2017</a:t>
             </a:fld>
             <a:endParaRPr lang="en-US"/>
           </a:p>
@@ -5588,19 +5588,7 @@
                 <a:ea typeface="+mn-ea"/>
                 <a:cs typeface="+mn-cs"/>
               </a:rPr>
-              <a:t> …, lệnh này thay thế những thay đổi trong "tree" đang làm việc với nội dung mới nhất của HEAD</a:t>
-            </a:r>
-            <a:r>
-              <a:rPr lang="en-US" sz="1200" b="0" i="0" kern="1200" smtClean="0">
-                <a:solidFill>
-                  <a:schemeClr val="tx1"/>
-                </a:solidFill>
-                <a:effectLst/>
-                <a:latin typeface="+mn-lt"/>
-                <a:ea typeface="+mn-ea"/>
-                <a:cs typeface="+mn-cs"/>
-              </a:rPr>
-              <a:t>.</a:t>
+              <a:t> …, lệnh này thay thế những thay đổi trong "tree" đang làm việc với nội dung mới nhất của HEAD.</a:t>
             </a:r>
           </a:p>
           <a:p>
@@ -6945,7 +6933,7 @@
           <a:p>
             <a:fld id="{AE51B48D-4355-45A2-8264-E48E89EC4DC5}" type="datetimeFigureOut">
               <a:rPr lang="en-US" smtClean="0"/>
-              <a:t>12/20/2017</a:t>
+              <a:t>12/21/2017</a:t>
             </a:fld>
             <a:endParaRPr lang="en-US"/>
           </a:p>
@@ -7153,7 +7141,7 @@
           <a:p>
             <a:fld id="{AE51B48D-4355-45A2-8264-E48E89EC4DC5}" type="datetimeFigureOut">
               <a:rPr lang="en-US" smtClean="0"/>
-              <a:t>12/20/2017</a:t>
+              <a:t>12/21/2017</a:t>
             </a:fld>
             <a:endParaRPr lang="en-US"/>
           </a:p>
@@ -7409,7 +7397,7 @@
           <a:p>
             <a:fld id="{AE51B48D-4355-45A2-8264-E48E89EC4DC5}" type="datetimeFigureOut">
               <a:rPr lang="en-US" smtClean="0"/>
-              <a:t>12/20/2017</a:t>
+              <a:t>12/21/2017</a:t>
             </a:fld>
             <a:endParaRPr lang="en-US"/>
           </a:p>
@@ -7583,7 +7571,7 @@
           <a:p>
             <a:fld id="{AE51B48D-4355-45A2-8264-E48E89EC4DC5}" type="datetimeFigureOut">
               <a:rPr lang="en-US" smtClean="0"/>
-              <a:t>12/20/2017</a:t>
+              <a:t>12/21/2017</a:t>
             </a:fld>
             <a:endParaRPr lang="en-US"/>
           </a:p>
@@ -7926,7 +7914,7 @@
           <a:p>
             <a:fld id="{AE51B48D-4355-45A2-8264-E48E89EC4DC5}" type="datetimeFigureOut">
               <a:rPr lang="en-US" smtClean="0"/>
-              <a:t>12/20/2017</a:t>
+              <a:t>12/21/2017</a:t>
             </a:fld>
             <a:endParaRPr lang="en-US"/>
           </a:p>
@@ -8201,7 +8189,7 @@
           <a:p>
             <a:fld id="{AE51B48D-4355-45A2-8264-E48E89EC4DC5}" type="datetimeFigureOut">
               <a:rPr lang="en-US" smtClean="0"/>
-              <a:t>12/20/2017</a:t>
+              <a:t>12/21/2017</a:t>
             </a:fld>
             <a:endParaRPr lang="en-US"/>
           </a:p>
@@ -8580,7 +8568,7 @@
           <a:p>
             <a:fld id="{AE51B48D-4355-45A2-8264-E48E89EC4DC5}" type="datetimeFigureOut">
               <a:rPr lang="en-US" smtClean="0"/>
-              <a:t>12/20/2017</a:t>
+              <a:t>12/21/2017</a:t>
             </a:fld>
             <a:endParaRPr lang="en-US"/>
           </a:p>
@@ -8698,7 +8686,7 @@
           <a:p>
             <a:fld id="{AE51B48D-4355-45A2-8264-E48E89EC4DC5}" type="datetimeFigureOut">
               <a:rPr lang="en-US" smtClean="0"/>
-              <a:t>12/20/2017</a:t>
+              <a:t>12/21/2017</a:t>
             </a:fld>
             <a:endParaRPr lang="en-US"/>
           </a:p>
@@ -8869,7 +8857,7 @@
           <a:p>
             <a:fld id="{AE51B48D-4355-45A2-8264-E48E89EC4DC5}" type="datetimeFigureOut">
               <a:rPr lang="en-US" smtClean="0"/>
-              <a:t>12/20/2017</a:t>
+              <a:t>12/21/2017</a:t>
             </a:fld>
             <a:endParaRPr lang="en-US"/>
           </a:p>
@@ -9223,7 +9211,7 @@
           <a:p>
             <a:fld id="{AE51B48D-4355-45A2-8264-E48E89EC4DC5}" type="datetimeFigureOut">
               <a:rPr lang="en-US" smtClean="0"/>
-              <a:t>12/20/2017</a:t>
+              <a:t>12/21/2017</a:t>
             </a:fld>
             <a:endParaRPr lang="en-US"/>
           </a:p>
@@ -9605,7 +9593,7 @@
           <a:p>
             <a:fld id="{AE51B48D-4355-45A2-8264-E48E89EC4DC5}" type="datetimeFigureOut">
               <a:rPr lang="en-US" smtClean="0"/>
-              <a:t>12/20/2017</a:t>
+              <a:t>12/21/2017</a:t>
             </a:fld>
             <a:endParaRPr lang="en-US"/>
           </a:p>
@@ -9892,7 +9880,7 @@
           <a:p>
             <a:fld id="{AE51B48D-4355-45A2-8264-E48E89EC4DC5}" type="datetimeFigureOut">
               <a:rPr lang="en-US" smtClean="0"/>
-              <a:t>12/20/2017</a:t>
+              <a:t>12/21/2017</a:t>
             </a:fld>
             <a:endParaRPr lang="en-US"/>
           </a:p>
@@ -11692,23 +11680,7 @@
                   <a:srgbClr val="C00000"/>
                 </a:solidFill>
               </a:rPr>
-              <a:t> </a:t>
-            </a:r>
-            <a:r>
-              <a:rPr lang="en-US">
-                <a:solidFill>
-                  <a:srgbClr val="C00000"/>
-                </a:solidFill>
-              </a:rPr>
-              <a:t>-format: $ git log --pretty=format:"%h - %an, %ar : </a:t>
-            </a:r>
-            <a:r>
-              <a:rPr lang="en-US">
-                <a:solidFill>
-                  <a:srgbClr val="C00000"/>
-                </a:solidFill>
-              </a:rPr>
-              <a:t>%</a:t>
+              <a:t> -format: $ git log --pretty=format:"%h - %an, %ar : %</a:t>
             </a:r>
             <a:r>
               <a:rPr lang="en-US" smtClean="0">
@@ -11740,11 +11712,6 @@
               </a:rPr>
               <a:t>--graph</a:t>
             </a:r>
-            <a:endParaRPr lang="en-US">
-              <a:solidFill>
-                <a:srgbClr val="C00000"/>
-              </a:solidFill>
-            </a:endParaRPr>
           </a:p>
         </p:txBody>
       </p:sp>
@@ -12662,11 +12629,7 @@
             </a:pPr>
             <a:r>
               <a:rPr lang="en-US" sz="1800" smtClean="0"/>
-              <a:t> This </a:t>
-            </a:r>
-            <a:r>
-              <a:rPr lang="en-US" sz="1800" smtClean="0"/>
-              <a:t>creates a directory, initializes a .git directory inside it, pulls down all the data for that repository and checks out a working copy of the latest version.</a:t>
+              <a:t> This creates a directory, initializes a .git directory inside it, pulls down all the data for that repository and checks out a working copy of the latest version.</a:t>
             </a:r>
             <a:endParaRPr lang="en-US" sz="1800"/>
           </a:p>
@@ -13651,6 +13614,109 @@
           </a:prstGeom>
         </p:spPr>
       </p:pic>
+      <p:sp>
+        <p:nvSpPr>
+          <p:cNvPr id="5" name="Right Brace 4"/>
+          <p:cNvSpPr/>
+          <p:nvPr/>
+        </p:nvSpPr>
+        <p:spPr>
+          <a:xfrm>
+            <a:off x="4610100" y="2876325"/>
+            <a:ext cx="406400" cy="646331"/>
+          </a:xfrm>
+          <a:prstGeom prst="rightBrace">
+            <a:avLst/>
+          </a:prstGeom>
+          <a:ln>
+            <a:solidFill>
+              <a:schemeClr val="accent2"/>
+            </a:solidFill>
+          </a:ln>
+        </p:spPr>
+        <p:style>
+          <a:lnRef idx="1">
+            <a:schemeClr val="accent1"/>
+          </a:lnRef>
+          <a:fillRef idx="0">
+            <a:schemeClr val="accent1"/>
+          </a:fillRef>
+          <a:effectRef idx="0">
+            <a:schemeClr val="accent1"/>
+          </a:effectRef>
+          <a:fontRef idx="minor">
+            <a:schemeClr val="tx1"/>
+          </a:fontRef>
+        </p:style>
+        <p:txBody>
+          <a:bodyPr rtlCol="0" anchor="ctr"/>
+          <a:lstStyle/>
+          <a:p>
+            <a:pPr algn="ctr"/>
+            <a:endParaRPr lang="en-US"/>
+          </a:p>
+        </p:txBody>
+      </p:sp>
+      <p:sp>
+        <p:nvSpPr>
+          <p:cNvPr id="6" name="TextBox 5"/>
+          <p:cNvSpPr txBox="1"/>
+          <p:nvPr/>
+        </p:nvSpPr>
+        <p:spPr>
+          <a:xfrm>
+            <a:off x="5016500" y="2984699"/>
+            <a:ext cx="4838700" cy="646331"/>
+          </a:xfrm>
+          <a:prstGeom prst="rect">
+            <a:avLst/>
+          </a:prstGeom>
+          <a:noFill/>
+        </p:spPr>
+        <p:txBody>
+          <a:bodyPr wrap="square" rtlCol="0">
+            <a:spAutoFit/>
+          </a:bodyPr>
+          <a:lstStyle/>
+          <a:p>
+            <a:r>
+              <a:rPr lang="en-US">
+                <a:solidFill>
+                  <a:srgbClr val="C00000"/>
+                </a:solidFill>
+              </a:rPr>
+              <a:t>$ git </a:t>
+            </a:r>
+            <a:r>
+              <a:rPr lang="en-US">
+                <a:solidFill>
+                  <a:srgbClr val="C00000"/>
+                </a:solidFill>
+              </a:rPr>
+              <a:t>rebase </a:t>
+            </a:r>
+            <a:r>
+              <a:rPr lang="en-US" smtClean="0">
+                <a:solidFill>
+                  <a:srgbClr val="C00000"/>
+                </a:solidFill>
+              </a:rPr>
+              <a:t>&lt;rebase_branch&gt; </a:t>
+            </a:r>
+            <a:r>
+              <a:rPr lang="en-US">
+                <a:solidFill>
+                  <a:srgbClr val="C00000"/>
+                </a:solidFill>
+              </a:rPr>
+              <a:t>&lt;working_branch&gt;</a:t>
+            </a:r>
+          </a:p>
+          <a:p>
+            <a:endParaRPr lang="en-US"/>
+          </a:p>
+        </p:txBody>
+      </p:sp>
     </p:spTree>
     <p:extLst>
       <p:ext uri="{BB962C8B-B14F-4D97-AF65-F5344CB8AC3E}">
@@ -13920,15 +13986,7 @@
                   <a:srgbClr val="C00000"/>
                 </a:solidFill>
               </a:rPr>
-              <a:t> $ </a:t>
-            </a:r>
-            <a:r>
-              <a:rPr lang="en-US" sz="1800" smtClean="0">
-                <a:solidFill>
-                  <a:srgbClr val="C00000"/>
-                </a:solidFill>
-              </a:rPr>
-              <a:t>git </a:t>
+              <a:t> $ git </a:t>
             </a:r>
             <a:r>
               <a:rPr lang="en-US" sz="1800">

</xml_diff>